<commit_message>
thesis  and test update?
</commit_message>
<xml_diff>
--- a/Test-Result/2022.08.25/figure.pptx
+++ b/Test-Result/2022.08.25/figure.pptx
@@ -261,7 +261,7 @@
           <a:p>
             <a:fld id="{8EBD558F-BBC2-4AB3-B48D-3C92DA5284BC}" type="datetimeFigureOut">
               <a:rPr lang="en-US" smtClean="0"/>
-              <a:t>8/29/2022</a:t>
+              <a:t>9/9/2022</a:t>
             </a:fld>
             <a:endParaRPr lang="en-US"/>
           </a:p>
@@ -459,7 +459,7 @@
           <a:p>
             <a:fld id="{8EBD558F-BBC2-4AB3-B48D-3C92DA5284BC}" type="datetimeFigureOut">
               <a:rPr lang="en-US" smtClean="0"/>
-              <a:t>8/29/2022</a:t>
+              <a:t>9/9/2022</a:t>
             </a:fld>
             <a:endParaRPr lang="en-US"/>
           </a:p>
@@ -667,7 +667,7 @@
           <a:p>
             <a:fld id="{8EBD558F-BBC2-4AB3-B48D-3C92DA5284BC}" type="datetimeFigureOut">
               <a:rPr lang="en-US" smtClean="0"/>
-              <a:t>8/29/2022</a:t>
+              <a:t>9/9/2022</a:t>
             </a:fld>
             <a:endParaRPr lang="en-US"/>
           </a:p>
@@ -865,7 +865,7 @@
           <a:p>
             <a:fld id="{8EBD558F-BBC2-4AB3-B48D-3C92DA5284BC}" type="datetimeFigureOut">
               <a:rPr lang="en-US" smtClean="0"/>
-              <a:t>8/29/2022</a:t>
+              <a:t>9/9/2022</a:t>
             </a:fld>
             <a:endParaRPr lang="en-US"/>
           </a:p>
@@ -1140,7 +1140,7 @@
           <a:p>
             <a:fld id="{8EBD558F-BBC2-4AB3-B48D-3C92DA5284BC}" type="datetimeFigureOut">
               <a:rPr lang="en-US" smtClean="0"/>
-              <a:t>8/29/2022</a:t>
+              <a:t>9/9/2022</a:t>
             </a:fld>
             <a:endParaRPr lang="en-US"/>
           </a:p>
@@ -1405,7 +1405,7 @@
           <a:p>
             <a:fld id="{8EBD558F-BBC2-4AB3-B48D-3C92DA5284BC}" type="datetimeFigureOut">
               <a:rPr lang="en-US" smtClean="0"/>
-              <a:t>8/29/2022</a:t>
+              <a:t>9/9/2022</a:t>
             </a:fld>
             <a:endParaRPr lang="en-US"/>
           </a:p>
@@ -1817,7 +1817,7 @@
           <a:p>
             <a:fld id="{8EBD558F-BBC2-4AB3-B48D-3C92DA5284BC}" type="datetimeFigureOut">
               <a:rPr lang="en-US" smtClean="0"/>
-              <a:t>8/29/2022</a:t>
+              <a:t>9/9/2022</a:t>
             </a:fld>
             <a:endParaRPr lang="en-US"/>
           </a:p>
@@ -1958,7 +1958,7 @@
           <a:p>
             <a:fld id="{8EBD558F-BBC2-4AB3-B48D-3C92DA5284BC}" type="datetimeFigureOut">
               <a:rPr lang="en-US" smtClean="0"/>
-              <a:t>8/29/2022</a:t>
+              <a:t>9/9/2022</a:t>
             </a:fld>
             <a:endParaRPr lang="en-US"/>
           </a:p>
@@ -2071,7 +2071,7 @@
           <a:p>
             <a:fld id="{8EBD558F-BBC2-4AB3-B48D-3C92DA5284BC}" type="datetimeFigureOut">
               <a:rPr lang="en-US" smtClean="0"/>
-              <a:t>8/29/2022</a:t>
+              <a:t>9/9/2022</a:t>
             </a:fld>
             <a:endParaRPr lang="en-US"/>
           </a:p>
@@ -2382,7 +2382,7 @@
           <a:p>
             <a:fld id="{8EBD558F-BBC2-4AB3-B48D-3C92DA5284BC}" type="datetimeFigureOut">
               <a:rPr lang="en-US" smtClean="0"/>
-              <a:t>8/29/2022</a:t>
+              <a:t>9/9/2022</a:t>
             </a:fld>
             <a:endParaRPr lang="en-US"/>
           </a:p>
@@ -2670,7 +2670,7 @@
           <a:p>
             <a:fld id="{8EBD558F-BBC2-4AB3-B48D-3C92DA5284BC}" type="datetimeFigureOut">
               <a:rPr lang="en-US" smtClean="0"/>
-              <a:t>8/29/2022</a:t>
+              <a:t>9/9/2022</a:t>
             </a:fld>
             <a:endParaRPr lang="en-US"/>
           </a:p>
@@ -2911,7 +2911,7 @@
           <a:p>
             <a:fld id="{8EBD558F-BBC2-4AB3-B48D-3C92DA5284BC}" type="datetimeFigureOut">
               <a:rPr lang="en-US" smtClean="0"/>
-              <a:t>8/29/2022</a:t>
+              <a:t>9/9/2022</a:t>
             </a:fld>
             <a:endParaRPr lang="en-US"/>
           </a:p>
@@ -4621,7 +4621,7 @@
         <p:spPr>
           <a:xfrm>
             <a:off x="9164738" y="3152001"/>
-            <a:ext cx="2069797" cy="553998"/>
+            <a:ext cx="2262158" cy="553998"/>
           </a:xfrm>
           <a:prstGeom prst="rect">
             <a:avLst/>
@@ -4638,7 +4638,7 @@
                 <a:latin typeface="Times New Roman" panose="02020603050405020304" pitchFamily="18" charset="0"/>
                 <a:cs typeface="Times New Roman" panose="02020603050405020304" pitchFamily="18" charset="0"/>
               </a:rPr>
-              <a:t>T=10ms/div</a:t>
+              <a:t>T=200ms/div</a:t>
             </a:r>
           </a:p>
         </p:txBody>

</xml_diff>